<commit_message>
sap xong spring core
</commit_message>
<xml_diff>
--- a/Spring.pptx
+++ b/Spring.pptx
@@ -10,11 +10,14 @@
     <p:sldId id="261" r:id="rId4"/>
     <p:sldId id="257" r:id="rId5"/>
     <p:sldId id="262" r:id="rId6"/>
-    <p:sldId id="263" r:id="rId7"/>
-    <p:sldId id="265" r:id="rId8"/>
-    <p:sldId id="264" r:id="rId9"/>
-    <p:sldId id="258" r:id="rId10"/>
-    <p:sldId id="260" r:id="rId11"/>
+    <p:sldId id="268" r:id="rId7"/>
+    <p:sldId id="263" r:id="rId8"/>
+    <p:sldId id="265" r:id="rId9"/>
+    <p:sldId id="266" r:id="rId10"/>
+    <p:sldId id="267" r:id="rId11"/>
+    <p:sldId id="264" r:id="rId12"/>
+    <p:sldId id="258" r:id="rId13"/>
+    <p:sldId id="260" r:id="rId14"/>
   </p:sldIdLst>
   <p:sldSz cx="12192000" cy="6858000"/>
   <p:notesSz cx="6858000" cy="9144000"/>
@@ -115,7 +118,7 @@
   </p:defaultTextStyle>
   <p:extLst>
     <p:ext uri="{EFAFB233-063F-42B5-8137-9DF3F51BA10A}">
-      <p15:sldGuideLst xmlns:p15="http://schemas.microsoft.com/office/powerpoint/2012/main"/>
+      <p15:sldGuideLst xmlns:p15="http://schemas.microsoft.com/office/powerpoint/2012/main" xmlns=""/>
     </p:ext>
   </p:extLst>
 </p:presentation>
@@ -3406,6 +3409,619 @@
           <a:lstStyle/>
           <a:p>
             <a:r>
+              <a:rPr lang="en-US" smtClean="0"/>
+              <a:t>Beans</a:t>
+            </a:r>
+            <a:endParaRPr lang="en-US" dirty="0"/>
+          </a:p>
+        </p:txBody>
+      </p:sp>
+      <p:sp>
+        <p:nvSpPr>
+          <p:cNvPr id="3" name="Content Placeholder 2"/>
+          <p:cNvSpPr>
+            <a:spLocks noGrp="1"/>
+          </p:cNvSpPr>
+          <p:nvPr>
+            <p:ph idx="1"/>
+          </p:nvPr>
+        </p:nvSpPr>
+        <p:spPr>
+          <a:xfrm>
+            <a:off x="910989" y="1525136"/>
+            <a:ext cx="9010934" cy="5080379"/>
+          </a:xfrm>
+        </p:spPr>
+        <p:txBody>
+          <a:bodyPr>
+            <a:noAutofit/>
+          </a:bodyPr>
+          <a:lstStyle/>
+          <a:p>
+            <a:pPr marL="45720" indent="0">
+              <a:buNone/>
+            </a:pPr>
+            <a:r>
+              <a:rPr lang="en-US" sz="2800">
+                <a:solidFill>
+                  <a:schemeClr val="tx1"/>
+                </a:solidFill>
+              </a:rPr>
+              <a:t>Beans </a:t>
+            </a:r>
+            <a:r>
+              <a:rPr lang="en-US" sz="2800" smtClean="0">
+                <a:solidFill>
+                  <a:schemeClr val="tx1"/>
+                </a:solidFill>
+              </a:rPr>
+              <a:t>Life Cycle</a:t>
+            </a:r>
+            <a:endParaRPr lang="en-US" sz="2800">
+              <a:solidFill>
+                <a:schemeClr val="tx1"/>
+              </a:solidFill>
+            </a:endParaRPr>
+          </a:p>
+          <a:p>
+            <a:endParaRPr lang="en-US" sz="1600" dirty="0">
+              <a:solidFill>
+                <a:schemeClr val="tx1"/>
+              </a:solidFill>
+            </a:endParaRPr>
+          </a:p>
+        </p:txBody>
+      </p:sp>
+    </p:spTree>
+    <p:extLst>
+      <p:ext uri="{BB962C8B-B14F-4D97-AF65-F5344CB8AC3E}">
+        <p14:creationId xmlns:p14="http://schemas.microsoft.com/office/powerpoint/2010/main" val="882262097"/>
+      </p:ext>
+    </p:extLst>
+  </p:cSld>
+  <p:clrMapOvr>
+    <a:masterClrMapping/>
+  </p:clrMapOvr>
+  <p:timing>
+    <p:tnLst>
+      <p:par>
+        <p:cTn id="1" dur="indefinite" restart="never" nodeType="tmRoot"/>
+      </p:par>
+    </p:tnLst>
+  </p:timing>
+</p:sld>
+</file>
+
+<file path=ppt/slides/slide11.xml><?xml version="1.0" encoding="utf-8"?>
+<p:sld xmlns:a="http://schemas.openxmlformats.org/drawingml/2006/main" xmlns:r="http://schemas.openxmlformats.org/officeDocument/2006/relationships" xmlns:p="http://schemas.openxmlformats.org/presentationml/2006/main">
+  <p:cSld>
+    <p:spTree>
+      <p:nvGrpSpPr>
+        <p:cNvPr id="1" name=""/>
+        <p:cNvGrpSpPr/>
+        <p:nvPr/>
+      </p:nvGrpSpPr>
+      <p:grpSpPr>
+        <a:xfrm>
+          <a:off x="0" y="0"/>
+          <a:ext cx="0" cy="0"/>
+          <a:chOff x="0" y="0"/>
+          <a:chExt cx="0" cy="0"/>
+        </a:xfrm>
+      </p:grpSpPr>
+      <p:sp>
+        <p:nvSpPr>
+          <p:cNvPr id="2" name="Title 1"/>
+          <p:cNvSpPr>
+            <a:spLocks noGrp="1"/>
+          </p:cNvSpPr>
+          <p:nvPr>
+            <p:ph type="title"/>
+          </p:nvPr>
+        </p:nvSpPr>
+        <p:spPr/>
+        <p:txBody>
+          <a:bodyPr/>
+          <a:lstStyle/>
+          <a:p>
+            <a:r>
+              <a:rPr lang="en-US" dirty="0" smtClean="0"/>
+              <a:t>Dependency </a:t>
+            </a:r>
+            <a:r>
+              <a:rPr lang="en-US" dirty="0"/>
+              <a:t>I</a:t>
+            </a:r>
+            <a:r>
+              <a:rPr lang="en-US" dirty="0" smtClean="0"/>
+              <a:t>njection</a:t>
+            </a:r>
+            <a:endParaRPr lang="en-US" dirty="0"/>
+          </a:p>
+        </p:txBody>
+      </p:sp>
+      <p:sp>
+        <p:nvSpPr>
+          <p:cNvPr id="3" name="Content Placeholder 2"/>
+          <p:cNvSpPr>
+            <a:spLocks noGrp="1"/>
+          </p:cNvSpPr>
+          <p:nvPr>
+            <p:ph idx="1"/>
+          </p:nvPr>
+        </p:nvSpPr>
+        <p:spPr>
+          <a:xfrm>
+            <a:off x="1143000" y="1733266"/>
+            <a:ext cx="9872871" cy="4362734"/>
+          </a:xfrm>
+        </p:spPr>
+        <p:txBody>
+          <a:bodyPr>
+            <a:normAutofit fontScale="92500" lnSpcReduction="20000"/>
+          </a:bodyPr>
+          <a:lstStyle/>
+          <a:p>
+            <a:pPr marL="45720" indent="0">
+              <a:buNone/>
+            </a:pPr>
+            <a:r>
+              <a:rPr lang="en-US" sz="2400" smtClean="0">
+                <a:solidFill>
+                  <a:schemeClr val="tx1"/>
+                </a:solidFill>
+              </a:rPr>
+              <a:t>DI: </a:t>
+            </a:r>
+          </a:p>
+          <a:p>
+            <a:pPr marL="45720" indent="0">
+              <a:buNone/>
+            </a:pPr>
+            <a:r>
+              <a:rPr lang="en-US" sz="2400" smtClean="0">
+                <a:solidFill>
+                  <a:schemeClr val="tx1"/>
+                </a:solidFill>
+              </a:rPr>
+              <a:t>DI trong Spring</a:t>
+            </a:r>
+            <a:endParaRPr lang="en-US" sz="2400" smtClean="0">
+              <a:solidFill>
+                <a:schemeClr val="tx1"/>
+              </a:solidFill>
+            </a:endParaRPr>
+          </a:p>
+          <a:p>
+            <a:r>
+              <a:rPr lang="en-US" sz="2400" smtClean="0">
+                <a:solidFill>
+                  <a:schemeClr val="tx1"/>
+                </a:solidFill>
+              </a:rPr>
+              <a:t>XML</a:t>
+            </a:r>
+          </a:p>
+          <a:p>
+            <a:pPr lvl="1"/>
+            <a:r>
+              <a:rPr lang="en-US" sz="2400" smtClean="0">
+                <a:solidFill>
+                  <a:schemeClr val="tx1"/>
+                </a:solidFill>
+              </a:rPr>
+              <a:t>Constructor-based</a:t>
+            </a:r>
+            <a:r>
+              <a:rPr lang="en-US" sz="2400" dirty="0" smtClean="0">
+                <a:solidFill>
+                  <a:schemeClr val="tx1"/>
+                </a:solidFill>
+              </a:rPr>
+              <a:t>: &lt;constructor-</a:t>
+            </a:r>
+            <a:r>
+              <a:rPr lang="en-US" sz="2400" dirty="0" err="1" smtClean="0">
+                <a:solidFill>
+                  <a:schemeClr val="tx1"/>
+                </a:solidFill>
+              </a:rPr>
+              <a:t>arg</a:t>
+            </a:r>
+            <a:r>
+              <a:rPr lang="en-US" sz="2400" dirty="0" smtClean="0">
+                <a:solidFill>
+                  <a:schemeClr val="tx1"/>
+                </a:solidFill>
+              </a:rPr>
+              <a:t> name</a:t>
+            </a:r>
+            <a:r>
+              <a:rPr lang="en-US" sz="2400" smtClean="0">
+                <a:solidFill>
+                  <a:schemeClr val="tx1"/>
+                </a:solidFill>
+              </a:rPr>
+              <a:t>=“…” </a:t>
+            </a:r>
+            <a:r>
+              <a:rPr lang="en-US" sz="2400" smtClean="0">
+                <a:solidFill>
+                  <a:schemeClr val="tx1"/>
+                </a:solidFill>
+              </a:rPr>
+              <a:t>value|ref</a:t>
+            </a:r>
+            <a:r>
+              <a:rPr lang="en-US" sz="2400" dirty="0" smtClean="0">
+                <a:solidFill>
+                  <a:schemeClr val="tx1"/>
+                </a:solidFill>
+              </a:rPr>
+              <a:t>=“…” /&gt;</a:t>
+            </a:r>
+          </a:p>
+          <a:p>
+            <a:pPr lvl="1"/>
+            <a:r>
+              <a:rPr lang="en-US" sz="2400" dirty="0" smtClean="0">
+                <a:solidFill>
+                  <a:schemeClr val="tx1"/>
+                </a:solidFill>
+              </a:rPr>
+              <a:t>Setter-based: &lt;property name</a:t>
+            </a:r>
+            <a:r>
+              <a:rPr lang="en-US" sz="2400" smtClean="0">
+                <a:solidFill>
+                  <a:schemeClr val="tx1"/>
+                </a:solidFill>
+              </a:rPr>
+              <a:t>=“…” </a:t>
+            </a:r>
+            <a:r>
+              <a:rPr lang="en-US" sz="2400" smtClean="0">
+                <a:solidFill>
+                  <a:schemeClr val="tx1"/>
+                </a:solidFill>
+              </a:rPr>
+              <a:t>value|ref</a:t>
+            </a:r>
+            <a:r>
+              <a:rPr lang="en-US" sz="2400" dirty="0" smtClean="0">
+                <a:solidFill>
+                  <a:schemeClr val="tx1"/>
+                </a:solidFill>
+              </a:rPr>
+              <a:t>=“…” /&gt;</a:t>
+            </a:r>
+          </a:p>
+          <a:p>
+            <a:r>
+              <a:rPr lang="en-US" sz="2400" smtClean="0">
+                <a:solidFill>
+                  <a:schemeClr val="tx1"/>
+                </a:solidFill>
+              </a:rPr>
+              <a:t>Annotation</a:t>
+            </a:r>
+          </a:p>
+          <a:p>
+            <a:pPr lvl="1"/>
+            <a:r>
+              <a:rPr lang="en-US">
+                <a:solidFill>
+                  <a:schemeClr val="tx1"/>
+                </a:solidFill>
+              </a:rPr>
+              <a:t>thêm cấu hình trong xml configure: &lt;context:annotation-config/&gt;, trong &lt;beans …&gt;</a:t>
+            </a:r>
+          </a:p>
+          <a:p>
+            <a:pPr lvl="1"/>
+            <a:r>
+              <a:rPr lang="en-US">
+                <a:solidFill>
+                  <a:schemeClr val="tx1"/>
+                </a:solidFill>
+              </a:rPr>
+              <a:t>@Required: thực hiện trên các property setter method</a:t>
+            </a:r>
+          </a:p>
+          <a:p>
+            <a:pPr lvl="1"/>
+            <a:r>
+              <a:rPr lang="en-US">
+                <a:solidFill>
+                  <a:schemeClr val="tx1"/>
+                </a:solidFill>
+              </a:rPr>
+              <a:t>@Autowired: trên contructor, properties, property setter method, non-setter method</a:t>
+            </a:r>
+          </a:p>
+          <a:p>
+            <a:pPr lvl="2"/>
+            <a:r>
+              <a:rPr lang="en-US">
+                <a:solidFill>
+                  <a:schemeClr val="tx1"/>
+                </a:solidFill>
+              </a:rPr>
+              <a:t>@Autowired(required=false</a:t>
+            </a:r>
+            <a:r>
+              <a:rPr lang="en-US">
+                <a:solidFill>
+                  <a:schemeClr val="tx1"/>
+                </a:solidFill>
+              </a:rPr>
+              <a:t>): </a:t>
+            </a:r>
+            <a:r>
+              <a:rPr lang="en-US" smtClean="0">
+                <a:solidFill>
+                  <a:schemeClr val="tx1"/>
+                </a:solidFill>
+              </a:rPr>
+              <a:t>bỏ mặc </a:t>
+            </a:r>
+            <a:r>
+              <a:rPr lang="en-US">
+                <a:solidFill>
+                  <a:schemeClr val="tx1"/>
+                </a:solidFill>
+              </a:rPr>
+              <a:t>định yêu cầu required</a:t>
+            </a:r>
+          </a:p>
+          <a:p>
+            <a:pPr lvl="2"/>
+            <a:r>
+              <a:rPr lang="en-US" smtClean="0">
+                <a:solidFill>
+                  <a:schemeClr val="tx1"/>
+                </a:solidFill>
+              </a:rPr>
+              <a:t>Cố </a:t>
+            </a:r>
+            <a:r>
+              <a:rPr lang="en-US">
+                <a:solidFill>
+                  <a:schemeClr val="tx1"/>
+                </a:solidFill>
+              </a:rPr>
+              <a:t>gắng thực hiện </a:t>
+            </a:r>
+            <a:r>
+              <a:rPr lang="en-US">
+                <a:solidFill>
+                  <a:schemeClr val="tx1"/>
+                </a:solidFill>
+              </a:rPr>
+              <a:t>autowiring </a:t>
+            </a:r>
+            <a:r>
+              <a:rPr lang="en-US" smtClean="0">
+                <a:solidFill>
+                  <a:schemeClr val="tx1"/>
+                </a:solidFill>
+              </a:rPr>
+              <a:t>theo byType</a:t>
+            </a:r>
+            <a:endParaRPr lang="en-US">
+              <a:solidFill>
+                <a:schemeClr val="tx1"/>
+              </a:solidFill>
+            </a:endParaRPr>
+          </a:p>
+          <a:p>
+            <a:pPr lvl="1"/>
+            <a:r>
+              <a:rPr lang="en-US">
+                <a:solidFill>
+                  <a:schemeClr val="tx1"/>
+                </a:solidFill>
+              </a:rPr>
+              <a:t>@Qualifier</a:t>
+            </a:r>
+            <a:r>
+              <a:rPr lang="en-US" sz="1800">
+                <a:solidFill>
+                  <a:schemeClr val="tx1"/>
+                </a:solidFill>
+              </a:rPr>
+              <a:t>: </a:t>
+            </a:r>
+            <a:r>
+              <a:rPr lang="en-US" sz="1800" smtClean="0">
+                <a:solidFill>
+                  <a:schemeClr val="tx1"/>
+                </a:solidFill>
+              </a:rPr>
+              <a:t>có nhiều bean cùng kiểu, để xác định rõ sẽ wire với bean nào bằng định danh name</a:t>
+            </a:r>
+          </a:p>
+          <a:p>
+            <a:pPr lvl="1"/>
+            <a:r>
+              <a:rPr lang="vi-VN" sz="1800">
+                <a:solidFill>
+                  <a:schemeClr val="tx1"/>
+                </a:solidFill>
+              </a:rPr>
+              <a:t>@</a:t>
+            </a:r>
+            <a:r>
+              <a:rPr lang="vi-VN" sz="1800" smtClean="0">
+                <a:solidFill>
+                  <a:schemeClr val="tx1"/>
+                </a:solidFill>
+              </a:rPr>
+              <a:t>PostConstruct, @PreDestroy, </a:t>
+            </a:r>
+            <a:r>
+              <a:rPr lang="vi-VN" sz="1800">
+                <a:solidFill>
+                  <a:schemeClr val="tx1"/>
+                </a:solidFill>
+              </a:rPr>
+              <a:t>@</a:t>
+            </a:r>
+            <a:r>
+              <a:rPr lang="vi-VN" sz="1800" smtClean="0">
+                <a:solidFill>
+                  <a:schemeClr val="tx1"/>
+                </a:solidFill>
+              </a:rPr>
+              <a:t>Resource ( như by-Name autowiring)</a:t>
+            </a:r>
+            <a:endParaRPr lang="en-US" sz="1800">
+              <a:solidFill>
+                <a:schemeClr val="tx1"/>
+              </a:solidFill>
+            </a:endParaRPr>
+          </a:p>
+          <a:p>
+            <a:endParaRPr lang="en-US" dirty="0">
+              <a:solidFill>
+                <a:schemeClr val="tx1"/>
+              </a:solidFill>
+            </a:endParaRPr>
+          </a:p>
+        </p:txBody>
+      </p:sp>
+    </p:spTree>
+    <p:extLst>
+      <p:ext uri="{BB962C8B-B14F-4D97-AF65-F5344CB8AC3E}">
+        <p14:creationId xmlns:p14="http://schemas.microsoft.com/office/powerpoint/2010/main" val="1736113905"/>
+      </p:ext>
+    </p:extLst>
+  </p:cSld>
+  <p:clrMapOvr>
+    <a:masterClrMapping/>
+  </p:clrMapOvr>
+  <p:timing>
+    <p:tnLst>
+      <p:par>
+        <p:cTn id="1" dur="indefinite" restart="never" nodeType="tmRoot"/>
+      </p:par>
+    </p:tnLst>
+  </p:timing>
+</p:sld>
+</file>
+
+<file path=ppt/slides/slide12.xml><?xml version="1.0" encoding="utf-8"?>
+<p:sld xmlns:a="http://schemas.openxmlformats.org/drawingml/2006/main" xmlns:r="http://schemas.openxmlformats.org/officeDocument/2006/relationships" xmlns:p="http://schemas.openxmlformats.org/presentationml/2006/main">
+  <p:cSld>
+    <p:spTree>
+      <p:nvGrpSpPr>
+        <p:cNvPr id="1" name=""/>
+        <p:cNvGrpSpPr/>
+        <p:nvPr/>
+      </p:nvGrpSpPr>
+      <p:grpSpPr>
+        <a:xfrm>
+          <a:off x="0" y="0"/>
+          <a:ext cx="0" cy="0"/>
+          <a:chOff x="0" y="0"/>
+          <a:chExt cx="0" cy="0"/>
+        </a:xfrm>
+      </p:grpSpPr>
+      <p:sp>
+        <p:nvSpPr>
+          <p:cNvPr id="2" name="Title 1"/>
+          <p:cNvSpPr>
+            <a:spLocks noGrp="1"/>
+          </p:cNvSpPr>
+          <p:nvPr>
+            <p:ph type="title"/>
+          </p:nvPr>
+        </p:nvSpPr>
+        <p:spPr/>
+        <p:txBody>
+          <a:bodyPr/>
+          <a:lstStyle/>
+          <a:p>
+            <a:r>
+              <a:rPr lang="en-US" dirty="0" smtClean="0"/>
+              <a:t>Spring MVC</a:t>
+            </a:r>
+            <a:endParaRPr lang="en-US" dirty="0"/>
+          </a:p>
+        </p:txBody>
+      </p:sp>
+      <p:sp>
+        <p:nvSpPr>
+          <p:cNvPr id="3" name="Content Placeholder 2"/>
+          <p:cNvSpPr>
+            <a:spLocks noGrp="1"/>
+          </p:cNvSpPr>
+          <p:nvPr>
+            <p:ph idx="1"/>
+          </p:nvPr>
+        </p:nvSpPr>
+        <p:spPr/>
+        <p:txBody>
+          <a:bodyPr/>
+          <a:lstStyle/>
+          <a:p>
+            <a:endParaRPr lang="en-US"/>
+          </a:p>
+        </p:txBody>
+      </p:sp>
+    </p:spTree>
+    <p:extLst>
+      <p:ext uri="{BB962C8B-B14F-4D97-AF65-F5344CB8AC3E}">
+        <p14:creationId xmlns:p14="http://schemas.microsoft.com/office/powerpoint/2010/main" val="2116481890"/>
+      </p:ext>
+    </p:extLst>
+  </p:cSld>
+  <p:clrMapOvr>
+    <a:masterClrMapping/>
+  </p:clrMapOvr>
+  <p:timing>
+    <p:tnLst>
+      <p:par>
+        <p:cTn id="1" dur="indefinite" restart="never" nodeType="tmRoot"/>
+      </p:par>
+    </p:tnLst>
+  </p:timing>
+</p:sld>
+</file>
+
+<file path=ppt/slides/slide13.xml><?xml version="1.0" encoding="utf-8"?>
+<p:sld xmlns:a="http://schemas.openxmlformats.org/drawingml/2006/main" xmlns:r="http://schemas.openxmlformats.org/officeDocument/2006/relationships" xmlns:p="http://schemas.openxmlformats.org/presentationml/2006/main">
+  <p:cSld>
+    <p:spTree>
+      <p:nvGrpSpPr>
+        <p:cNvPr id="1" name=""/>
+        <p:cNvGrpSpPr/>
+        <p:nvPr/>
+      </p:nvGrpSpPr>
+      <p:grpSpPr>
+        <a:xfrm>
+          <a:off x="0" y="0"/>
+          <a:ext cx="0" cy="0"/>
+          <a:chOff x="0" y="0"/>
+          <a:chExt cx="0" cy="0"/>
+        </a:xfrm>
+      </p:grpSpPr>
+      <p:sp>
+        <p:nvSpPr>
+          <p:cNvPr id="2" name="Title 1"/>
+          <p:cNvSpPr>
+            <a:spLocks noGrp="1"/>
+          </p:cNvSpPr>
+          <p:nvPr>
+            <p:ph type="title"/>
+          </p:nvPr>
+        </p:nvSpPr>
+        <p:spPr/>
+        <p:txBody>
+          <a:bodyPr/>
+          <a:lstStyle/>
+          <a:p>
+            <a:r>
               <a:rPr lang="en-US" dirty="0" smtClean="0"/>
               <a:t>Spring Boot</a:t>
             </a:r>
@@ -3442,6 +4058,13 @@
   <p:clrMapOvr>
     <a:masterClrMapping/>
   </p:clrMapOvr>
+  <p:timing>
+    <p:tnLst>
+      <p:par>
+        <p:cTn id="1" dur="indefinite" restart="never" nodeType="tmRoot"/>
+      </p:par>
+    </p:tnLst>
+  </p:timing>
 </p:sld>
 </file>
 
@@ -3614,8 +4237,8 @@
         </p:blipFill>
         <p:spPr bwMode="auto">
           <a:xfrm>
-            <a:off x="7877202" y="2049087"/>
-            <a:ext cx="3885714" cy="3371429"/>
+            <a:off x="6918784" y="1612597"/>
+            <a:ext cx="5031916" cy="4365928"/>
           </a:xfrm>
           <a:prstGeom prst="rect">
             <a:avLst/>
@@ -3640,8 +4263,8 @@
         </p:nvSpPr>
         <p:spPr>
           <a:xfrm>
-            <a:off x="810491" y="2130135"/>
-            <a:ext cx="6525491" cy="1477328"/>
+            <a:off x="223627" y="2130135"/>
+            <a:ext cx="6746009" cy="2308324"/>
           </a:xfrm>
           <a:prstGeom prst="rect">
             <a:avLst/>
@@ -3659,7 +4282,7 @@
               <a:buChar char="-"/>
             </a:pPr>
             <a:r>
-              <a:rPr lang="en-US" dirty="0" smtClean="0">
+              <a:rPr lang="en-US" sz="2400" dirty="0" smtClean="0">
                 <a:solidFill>
                   <a:schemeClr val="accent2"/>
                 </a:solidFill>
@@ -3673,29 +4296,58 @@
               <a:buChar char="•"/>
             </a:pPr>
             <a:r>
-              <a:rPr lang="en-US" dirty="0" smtClean="0">
+              <a:rPr lang="en-US" sz="2400" dirty="0" smtClean="0">
                 <a:solidFill>
                   <a:schemeClr val="accent2"/>
                 </a:solidFill>
               </a:rPr>
-              <a:t>Core module: </a:t>
-            </a:r>
-            <a:r>
-              <a:rPr lang="en-US" dirty="0" err="1" smtClean="0">
+              <a:t>Core module</a:t>
+            </a:r>
+            <a:r>
+              <a:rPr lang="en-US" sz="2400" smtClean="0">
                 <a:solidFill>
                   <a:schemeClr val="accent2"/>
                 </a:solidFill>
               </a:rPr>
-              <a:t>IoC</a:t>
-            </a:r>
-            <a:r>
-              <a:rPr lang="en-US" dirty="0" smtClean="0">
+              <a:t>: </a:t>
+            </a:r>
+            <a:r>
+              <a:rPr lang="en-US" sz="2400" smtClean="0">
                 <a:solidFill>
                   <a:schemeClr val="accent2"/>
                 </a:solidFill>
               </a:rPr>
-              <a:t> &amp; Dependency Injection</a:t>
-            </a:r>
+              <a:t>Inversion of Controll (IoC) </a:t>
+            </a:r>
+            <a:r>
+              <a:rPr lang="en-US" sz="2400" dirty="0" smtClean="0">
+                <a:solidFill>
+                  <a:schemeClr val="accent2"/>
+                </a:solidFill>
+              </a:rPr>
+              <a:t>&amp; </a:t>
+            </a:r>
+            <a:r>
+              <a:rPr lang="en-US" sz="2400" smtClean="0">
+                <a:solidFill>
+                  <a:schemeClr val="accent2"/>
+                </a:solidFill>
+              </a:rPr>
+              <a:t>Dependency </a:t>
+            </a:r>
+            <a:r>
+              <a:rPr lang="en-US" sz="2400" smtClean="0">
+                <a:solidFill>
+                  <a:schemeClr val="accent2"/>
+                </a:solidFill>
+              </a:rPr>
+              <a:t>Injection (DI)</a:t>
+            </a:r>
+            <a:endParaRPr lang="en-US" sz="2400" dirty="0" smtClean="0">
+              <a:solidFill>
+                <a:schemeClr val="accent2"/>
+              </a:solidFill>
+            </a:endParaRPr>
           </a:p>
           <a:p>
             <a:pPr marL="742950" lvl="1" indent="-285750">
@@ -3703,7 +4355,7 @@
               <a:buChar char="•"/>
             </a:pPr>
             <a:r>
-              <a:rPr lang="en-US" dirty="0" smtClean="0">
+              <a:rPr lang="en-US" sz="2400" dirty="0" smtClean="0">
                 <a:solidFill>
                   <a:schemeClr val="accent2"/>
                 </a:solidFill>
@@ -3711,7 +4363,7 @@
               <a:t>Beans </a:t>
             </a:r>
             <a:r>
-              <a:rPr lang="en-US" dirty="0">
+              <a:rPr lang="en-US" sz="2400" dirty="0">
                 <a:solidFill>
                   <a:schemeClr val="accent2"/>
                 </a:solidFill>
@@ -3719,7 +4371,7 @@
               <a:t>module </a:t>
             </a:r>
             <a:r>
-              <a:rPr lang="en-US" dirty="0" smtClean="0">
+              <a:rPr lang="en-US" sz="2400" dirty="0" smtClean="0">
                 <a:solidFill>
                   <a:schemeClr val="accent2"/>
                 </a:solidFill>
@@ -3727,14 +4379,14 @@
               <a:t>: </a:t>
             </a:r>
             <a:r>
-              <a:rPr lang="en-US" dirty="0" err="1" smtClean="0">
+              <a:rPr lang="en-US" sz="2400" dirty="0" err="1" smtClean="0">
                 <a:solidFill>
                   <a:schemeClr val="accent2"/>
                 </a:solidFill>
               </a:rPr>
               <a:t>BeanFactory</a:t>
             </a:r>
-            <a:endParaRPr lang="en-US" dirty="0" smtClean="0">
+            <a:endParaRPr lang="en-US" sz="2400" dirty="0" smtClean="0">
               <a:solidFill>
                 <a:schemeClr val="accent2"/>
               </a:solidFill>
@@ -3746,7 +4398,7 @@
               <a:buChar char="•"/>
             </a:pPr>
             <a:r>
-              <a:rPr lang="en-US" dirty="0" smtClean="0">
+              <a:rPr lang="en-US" sz="2400" dirty="0" smtClean="0">
                 <a:solidFill>
                   <a:schemeClr val="accent2"/>
                 </a:solidFill>
@@ -3754,7 +4406,7 @@
               <a:t>Context </a:t>
             </a:r>
             <a:r>
-              <a:rPr lang="en-US" dirty="0">
+              <a:rPr lang="en-US" sz="2400" dirty="0">
                 <a:solidFill>
                   <a:schemeClr val="accent2"/>
                 </a:solidFill>
@@ -3762,7 +4414,7 @@
               <a:t>module </a:t>
             </a:r>
             <a:r>
-              <a:rPr lang="en-US" dirty="0" smtClean="0">
+              <a:rPr lang="en-US" sz="2400" dirty="0" smtClean="0">
                 <a:solidFill>
                   <a:schemeClr val="accent2"/>
                 </a:solidFill>
@@ -3770,14 +4422,14 @@
               <a:t>: </a:t>
             </a:r>
             <a:r>
-              <a:rPr lang="en-US" dirty="0" err="1" smtClean="0">
+              <a:rPr lang="en-US" sz="2400" dirty="0" err="1" smtClean="0">
                 <a:solidFill>
                   <a:schemeClr val="accent2"/>
                 </a:solidFill>
               </a:rPr>
               <a:t>ApplicationContext</a:t>
             </a:r>
-            <a:endParaRPr lang="en-US" dirty="0" smtClean="0">
+            <a:endParaRPr lang="en-US" sz="2400" dirty="0" smtClean="0">
               <a:solidFill>
                 <a:schemeClr val="accent2"/>
               </a:solidFill>
@@ -3789,7 +4441,7 @@
               <a:buChar char="•"/>
             </a:pPr>
             <a:r>
-              <a:rPr lang="en-US" dirty="0" err="1" smtClean="0">
+              <a:rPr lang="en-US" sz="2400" dirty="0" err="1" smtClean="0">
                 <a:solidFill>
                   <a:schemeClr val="accent2"/>
                 </a:solidFill>
@@ -3797,7 +4449,7 @@
               <a:t>SpEL</a:t>
             </a:r>
             <a:r>
-              <a:rPr lang="en-US" dirty="0" smtClean="0">
+              <a:rPr lang="en-US" sz="2400" dirty="0" smtClean="0">
                 <a:solidFill>
                   <a:schemeClr val="accent2"/>
                 </a:solidFill>
@@ -3805,7 +4457,7 @@
               <a:t> </a:t>
             </a:r>
             <a:r>
-              <a:rPr lang="en-US" dirty="0">
+              <a:rPr lang="en-US" sz="2400" dirty="0">
                 <a:solidFill>
                   <a:schemeClr val="accent2"/>
                 </a:solidFill>
@@ -3925,6 +4577,13 @@
   <p:clrMapOvr>
     <a:masterClrMapping/>
   </p:clrMapOvr>
+  <p:timing>
+    <p:tnLst>
+      <p:par>
+        <p:cTn id="1" dur="indefinite" restart="never" nodeType="tmRoot"/>
+      </p:par>
+    </p:tnLst>
+  </p:timing>
 </p:sld>
 </file>
 
@@ -3982,7 +4641,7 @@
             <p:ph idx="1"/>
           </p:nvPr>
         </p:nvPicPr>
-        <p:blipFill>
+        <p:blipFill rotWithShape="1">
           <a:blip r:embed="rId2">
             <a:extLst>
               <a:ext uri="{28A0092B-C50C-407E-A947-70E740481C1C}">
@@ -3990,15 +4649,13 @@
               </a:ext>
             </a:extLst>
           </a:blip>
-          <a:srcRect/>
-          <a:stretch>
-            <a:fillRect/>
-          </a:stretch>
+          <a:srcRect l="232" t="727" r="7430" b="327"/>
+          <a:stretch/>
         </p:blipFill>
         <p:spPr bwMode="auto">
           <a:xfrm>
-            <a:off x="7146998" y="2390956"/>
-            <a:ext cx="4743450" cy="2819400"/>
+            <a:off x="6390185" y="1337480"/>
+            <a:ext cx="5456072" cy="4105716"/>
           </a:xfrm>
           <a:prstGeom prst="rect">
             <a:avLst/>
@@ -4017,8 +4674,8 @@
         </p:nvSpPr>
         <p:spPr>
           <a:xfrm>
-            <a:off x="997526" y="2067791"/>
-            <a:ext cx="5860473" cy="1200329"/>
+            <a:off x="315126" y="1672006"/>
+            <a:ext cx="6890892" cy="5170646"/>
           </a:xfrm>
           <a:prstGeom prst="rect">
             <a:avLst/>
@@ -4032,72 +4689,149 @@
           <a:lstStyle/>
           <a:p>
             <a:pPr marL="285750" indent="-285750">
-              <a:buFontTx/>
-              <a:buChar char="-"/>
+              <a:buFont typeface="Arial" panose="020B0604020202020204" pitchFamily="34" charset="0"/>
+              <a:buChar char="•"/>
             </a:pPr>
             <a:r>
-              <a:rPr lang="en-US" dirty="0"/>
-              <a:t>POJOs: </a:t>
-            </a:r>
-            <a:r>
-              <a:rPr lang="en-US" dirty="0" smtClean="0"/>
-              <a:t>(plain </a:t>
-            </a:r>
-            <a:r>
-              <a:rPr lang="en-US" dirty="0"/>
-              <a:t>old Java </a:t>
-            </a:r>
-            <a:r>
-              <a:rPr lang="en-US" dirty="0" smtClean="0"/>
-              <a:t>object) </a:t>
-            </a:r>
-            <a:r>
-              <a:rPr lang="en-US" dirty="0" err="1" smtClean="0"/>
+              <a:rPr lang="en-US" sz="2400" smtClean="0"/>
+              <a:t> POJOs</a:t>
+            </a:r>
+            <a:r>
+              <a:rPr lang="en-US" sz="2400"/>
+              <a:t>: </a:t>
+            </a:r>
+            <a:r>
+              <a:rPr lang="en-US" sz="2400" smtClean="0"/>
+              <a:t>(Plain </a:t>
+            </a:r>
+            <a:r>
+              <a:rPr lang="en-US" sz="2400" dirty="0"/>
+              <a:t>O</a:t>
+            </a:r>
+            <a:r>
+              <a:rPr lang="en-US" sz="2400" smtClean="0"/>
+              <a:t>ld </a:t>
+            </a:r>
+            <a:r>
+              <a:rPr lang="en-US" sz="2400"/>
+              <a:t>Java </a:t>
+            </a:r>
+            <a:r>
+              <a:rPr lang="en-US" sz="2400" smtClean="0"/>
+              <a:t>O</a:t>
+            </a:r>
+            <a:r>
+              <a:rPr lang="en-US" sz="2400" smtClean="0"/>
+              <a:t>bjects) </a:t>
+            </a:r>
+            <a:r>
+              <a:rPr lang="en-US" sz="2400" dirty="0" err="1" smtClean="0"/>
               <a:t>các</a:t>
             </a:r>
             <a:r>
-              <a:rPr lang="en-US" dirty="0" smtClean="0"/>
+              <a:rPr lang="en-US" sz="2400" dirty="0" smtClean="0"/>
               <a:t> </a:t>
             </a:r>
             <a:r>
-              <a:rPr lang="en-US" dirty="0" err="1" smtClean="0"/>
+              <a:rPr lang="en-US" sz="2400" dirty="0" err="1" smtClean="0"/>
               <a:t>đối</a:t>
             </a:r>
             <a:r>
-              <a:rPr lang="en-US" dirty="0" smtClean="0"/>
+              <a:rPr lang="en-US" sz="2400" dirty="0" smtClean="0"/>
               <a:t> </a:t>
             </a:r>
             <a:r>
-              <a:rPr lang="en-US" dirty="0" err="1" smtClean="0"/>
+              <a:rPr lang="en-US" sz="2400" dirty="0" err="1" smtClean="0"/>
               <a:t>tượng</a:t>
             </a:r>
             <a:r>
-              <a:rPr lang="en-US" dirty="0" smtClean="0"/>
+              <a:rPr lang="en-US" sz="2400" dirty="0" smtClean="0"/>
               <a:t> Java </a:t>
             </a:r>
             <a:r>
-              <a:rPr lang="en-US" dirty="0" err="1" smtClean="0"/>
+              <a:rPr lang="en-US" sz="2400" err="1" smtClean="0"/>
               <a:t>thuần</a:t>
             </a:r>
             <a:r>
-              <a:rPr lang="en-US" dirty="0" smtClean="0"/>
+              <a:rPr lang="en-US" sz="2400" smtClean="0"/>
               <a:t> </a:t>
             </a:r>
             <a:r>
-              <a:rPr lang="en-US" dirty="0" err="1" smtClean="0"/>
-              <a:t>túy</a:t>
-            </a:r>
-            <a:endParaRPr lang="en-US" dirty="0" smtClean="0"/>
+              <a:rPr lang="en-US" sz="2400" smtClean="0"/>
+              <a:t>túy: chỉ gồm các thuộc tính và method, ko extends, implements</a:t>
+            </a:r>
+            <a:endParaRPr lang="en-US" sz="2400" dirty="0"/>
           </a:p>
           <a:p>
             <a:pPr marL="285750" indent="-285750">
-              <a:buFontTx/>
-              <a:buChar char="-"/>
+              <a:buFont typeface="Arial" panose="020B0604020202020204" pitchFamily="34" charset="0"/>
+              <a:buChar char="•"/>
             </a:pPr>
             <a:r>
-              <a:rPr lang="en-US" dirty="0" smtClean="0"/>
-              <a:t>Configuration Metadata: XML, Annotations, Java code</a:t>
-            </a:r>
+              <a:rPr lang="en-US" sz="2400" smtClean="0"/>
+              <a:t>Configuration </a:t>
+            </a:r>
+            <a:r>
+              <a:rPr lang="en-US" sz="2400" dirty="0" smtClean="0"/>
+              <a:t>Metadata: XML, Annotations, </a:t>
+            </a:r>
+            <a:r>
+              <a:rPr lang="en-US" sz="2400" smtClean="0"/>
+              <a:t>Java </a:t>
+            </a:r>
+            <a:r>
+              <a:rPr lang="en-US" sz="2400" smtClean="0"/>
+              <a:t>code</a:t>
+            </a:r>
+          </a:p>
+          <a:p>
+            <a:pPr marL="285750" indent="-285750">
+              <a:buFont typeface="Arial" panose="020B0604020202020204" pitchFamily="34" charset="0"/>
+              <a:buChar char="•"/>
+            </a:pPr>
+            <a:r>
+              <a:rPr lang="en-US" sz="2400" smtClean="0"/>
+              <a:t>IoC: xử lý mà nhờ đó các Objects xác định chúng sẽ làm việc với những objects nào hay các dependencies</a:t>
+            </a:r>
+          </a:p>
+          <a:p>
+            <a:pPr marL="285750" indent="-285750">
+              <a:buFont typeface="Arial" panose="020B0604020202020204" pitchFamily="34" charset="0"/>
+              <a:buChar char="•"/>
+            </a:pPr>
+            <a:r>
+              <a:rPr lang="en-US" sz="2400" smtClean="0"/>
+              <a:t>IoC Container:</a:t>
+            </a:r>
+          </a:p>
+          <a:p>
+            <a:pPr marL="742950" lvl="1" indent="-285750">
+              <a:buFont typeface="Arial" panose="020B0604020202020204" pitchFamily="34" charset="0"/>
+              <a:buChar char="•"/>
+            </a:pPr>
+            <a:r>
+              <a:rPr lang="en-US" sz="2400" smtClean="0"/>
+              <a:t>BeanFactory: cung cấp cấu hình, chức năng cơ bản để quản lý bất kỳ kiểu đối tượng nào</a:t>
+            </a:r>
+          </a:p>
+          <a:p>
+            <a:pPr marL="742950" lvl="1" indent="-285750">
+              <a:buFont typeface="Arial" panose="020B0604020202020204" pitchFamily="34" charset="0"/>
+              <a:buChar char="•"/>
+            </a:pPr>
+            <a:r>
+              <a:rPr lang="en-US" sz="2400"/>
+              <a:t>ApplicationContext: </a:t>
+            </a:r>
+            <a:r>
+              <a:rPr lang="en-US" sz="2400"/>
+              <a:t>BeanFactory </a:t>
+            </a:r>
+            <a:r>
+              <a:rPr lang="en-US" sz="2400" smtClean="0"/>
+              <a:t>+ enterprise-specific functionality</a:t>
+            </a:r>
+            <a:endParaRPr lang="en-US" sz="2400" dirty="0" smtClean="0"/>
           </a:p>
           <a:p>
             <a:pPr marL="285750" indent="-285750">
@@ -4118,6 +4852,13 @@
   <p:clrMapOvr>
     <a:masterClrMapping/>
   </p:clrMapOvr>
+  <p:timing>
+    <p:tnLst>
+      <p:par>
+        <p:cTn id="1" dur="indefinite" restart="never" nodeType="tmRoot"/>
+      </p:par>
+    </p:tnLst>
+  </p:timing>
 </p:sld>
 </file>
 
@@ -4154,96 +4895,53 @@
           <a:lstStyle/>
           <a:p>
             <a:r>
+              <a:rPr lang="en-US" dirty="0" err="1" smtClean="0"/>
+              <a:t>IoC</a:t>
+            </a:r>
+            <a:r>
               <a:rPr lang="en-US" dirty="0" smtClean="0"/>
-              <a:t>Beans</a:t>
-            </a:r>
-            <a:endParaRPr lang="en-US" dirty="0"/>
-          </a:p>
-        </p:txBody>
-      </p:sp>
-      <p:sp>
-        <p:nvSpPr>
-          <p:cNvPr id="3" name="Content Placeholder 2"/>
-          <p:cNvSpPr>
-            <a:spLocks noGrp="1"/>
-          </p:cNvSpPr>
-          <p:nvPr>
-            <p:ph idx="1"/>
-          </p:nvPr>
-        </p:nvSpPr>
-        <p:spPr/>
-        <p:txBody>
-          <a:bodyPr>
-            <a:normAutofit/>
+              <a:t> Container</a:t>
+            </a:r>
+            <a:endParaRPr lang="en-US" dirty="0"/>
+          </a:p>
+        </p:txBody>
+      </p:sp>
+      <p:sp>
+        <p:nvSpPr>
+          <p:cNvPr id="5" name="TextBox 4"/>
+          <p:cNvSpPr txBox="1"/>
+          <p:nvPr/>
+        </p:nvSpPr>
+        <p:spPr>
+          <a:xfrm>
+            <a:off x="315126" y="1672006"/>
+            <a:ext cx="6890892" cy="738664"/>
+          </a:xfrm>
+          <a:prstGeom prst="rect">
+            <a:avLst/>
+          </a:prstGeom>
+          <a:noFill/>
+        </p:spPr>
+        <p:txBody>
+          <a:bodyPr wrap="square" rtlCol="0">
+            <a:spAutoFit/>
           </a:bodyPr>
           <a:lstStyle/>
           <a:p>
-            <a:r>
-              <a:rPr lang="en-US" dirty="0" smtClean="0"/>
-              <a:t>Bean Definition: xml, annotation, java code </a:t>
-            </a:r>
-          </a:p>
-          <a:p>
-            <a:r>
-              <a:rPr lang="en-US" dirty="0" smtClean="0"/>
-              <a:t>Bean Scope: singleton, prototype, request, session, application, </a:t>
-            </a:r>
-            <a:r>
-              <a:rPr lang="en-US" dirty="0" err="1" smtClean="0"/>
-              <a:t>websocket</a:t>
-            </a:r>
-            <a:endParaRPr lang="en-US" dirty="0" smtClean="0"/>
-          </a:p>
-          <a:p>
-            <a:r>
-              <a:rPr lang="en-US" dirty="0" smtClean="0"/>
-              <a:t>Bean Life Cycle: </a:t>
-            </a:r>
-          </a:p>
-          <a:p>
-            <a:pPr lvl="1"/>
-            <a:r>
-              <a:rPr lang="en-US" dirty="0" err="1" smtClean="0"/>
-              <a:t>Init</a:t>
-            </a:r>
-            <a:r>
-              <a:rPr lang="en-US" dirty="0" smtClean="0"/>
-              <a:t>-method</a:t>
-            </a:r>
-          </a:p>
-          <a:p>
-            <a:pPr lvl="1"/>
-            <a:r>
-              <a:rPr lang="en-US" dirty="0" smtClean="0"/>
-              <a:t>destroy-method:</a:t>
-            </a:r>
-          </a:p>
-          <a:p>
-            <a:pPr lvl="2"/>
-            <a:r>
-              <a:rPr lang="en-US" dirty="0" err="1" smtClean="0"/>
-              <a:t>AbstractApplicationContext</a:t>
-            </a:r>
-            <a:r>
-              <a:rPr lang="en-US" dirty="0" smtClean="0"/>
-              <a:t> context -&gt; </a:t>
-            </a:r>
-            <a:r>
-              <a:rPr lang="en-US" dirty="0"/>
-              <a:t>context </a:t>
-            </a:r>
-            <a:r>
-              <a:rPr lang="en-US" dirty="0" smtClean="0"/>
-              <a:t>.</a:t>
-            </a:r>
-            <a:r>
-              <a:rPr lang="en-US" dirty="0" err="1" smtClean="0"/>
-              <a:t>registerShutdownHook</a:t>
-            </a:r>
-            <a:r>
-              <a:rPr lang="en-US" dirty="0" smtClean="0"/>
-              <a:t>()</a:t>
-            </a:r>
+            <a:pPr marL="285750" indent="-285750">
+              <a:buFont typeface="Arial" panose="020B0604020202020204" pitchFamily="34" charset="0"/>
+              <a:buChar char="•"/>
+            </a:pPr>
+            <a:r>
+              <a:rPr lang="en-US" sz="2400" smtClean="0"/>
+              <a:t>Ví dụ Config và IoC Container</a:t>
+            </a:r>
+          </a:p>
+          <a:p>
+            <a:pPr marL="285750" indent="-285750">
+              <a:buFontTx/>
+              <a:buChar char="-"/>
+            </a:pPr>
             <a:endParaRPr lang="en-US" dirty="0"/>
           </a:p>
         </p:txBody>
@@ -4251,13 +4949,20 @@
     </p:spTree>
     <p:extLst>
       <p:ext uri="{BB962C8B-B14F-4D97-AF65-F5344CB8AC3E}">
-        <p14:creationId xmlns:p14="http://schemas.microsoft.com/office/powerpoint/2010/main" val="2111838338"/>
+        <p14:creationId xmlns:p14="http://schemas.microsoft.com/office/powerpoint/2010/main" val="2785261490"/>
       </p:ext>
     </p:extLst>
   </p:cSld>
   <p:clrMapOvr>
     <a:masterClrMapping/>
   </p:clrMapOvr>
+  <p:timing>
+    <p:tnLst>
+      <p:par>
+        <p:cTn id="1" dur="indefinite" restart="never" nodeType="tmRoot"/>
+      </p:par>
+    </p:tnLst>
+  </p:timing>
 </p:sld>
 </file>
 
@@ -4295,11 +5000,7 @@
           <a:p>
             <a:r>
               <a:rPr lang="en-US" dirty="0" smtClean="0"/>
-              <a:t>Beans </a:t>
-            </a:r>
-            <a:r>
-              <a:rPr lang="en-US" dirty="0" err="1" smtClean="0"/>
-              <a:t>Difinition</a:t>
+              <a:t>Beans</a:t>
             </a:r>
             <a:endParaRPr lang="en-US" dirty="0"/>
           </a:p>
@@ -4315,398 +5016,226 @@
             <p:ph idx="1"/>
           </p:nvPr>
         </p:nvSpPr>
-        <p:spPr/>
+        <p:spPr>
+          <a:xfrm>
+            <a:off x="269528" y="1596788"/>
+            <a:ext cx="9872871" cy="4499212"/>
+          </a:xfrm>
+        </p:spPr>
         <p:txBody>
           <a:bodyPr>
-            <a:normAutofit fontScale="85000" lnSpcReduction="20000"/>
+            <a:normAutofit lnSpcReduction="10000"/>
           </a:bodyPr>
           <a:lstStyle/>
           <a:p>
-            <a:r>
-              <a:rPr lang="en-US" dirty="0" smtClean="0"/>
-              <a:t>XML</a:t>
+            <a:pPr marL="45720" indent="0">
+              <a:buNone/>
+            </a:pPr>
+            <a:r>
+              <a:rPr lang="en-US" sz="2800" smtClean="0">
+                <a:solidFill>
+                  <a:schemeClr val="tx1"/>
+                </a:solidFill>
+              </a:rPr>
+              <a:t>Bean: </a:t>
+            </a:r>
+          </a:p>
+          <a:p>
+            <a:pPr marL="45720" indent="0">
+              <a:buNone/>
+            </a:pPr>
+            <a:r>
+              <a:rPr lang="en-US" sz="2800" smtClean="0">
+                <a:solidFill>
+                  <a:schemeClr val="tx1"/>
+                </a:solidFill>
+              </a:rPr>
+              <a:t>Bean trong Spring</a:t>
+            </a:r>
+          </a:p>
+          <a:p>
+            <a:r>
+              <a:rPr lang="en-US" sz="2800" smtClean="0">
+                <a:solidFill>
+                  <a:schemeClr val="tx1"/>
+                </a:solidFill>
+              </a:rPr>
+              <a:t>Bean Definition: </a:t>
+            </a:r>
+            <a:r>
+              <a:rPr lang="en-US" sz="2800" dirty="0" smtClean="0">
+                <a:solidFill>
+                  <a:schemeClr val="tx1"/>
+                </a:solidFill>
+              </a:rPr>
+              <a:t>xml</a:t>
+            </a:r>
+            <a:r>
+              <a:rPr lang="en-US" sz="2800" smtClean="0">
+                <a:solidFill>
+                  <a:schemeClr val="tx1"/>
+                </a:solidFill>
+              </a:rPr>
+              <a:t>, </a:t>
+            </a:r>
+            <a:r>
+              <a:rPr lang="en-US" sz="2800" smtClean="0">
+                <a:solidFill>
+                  <a:schemeClr val="tx1"/>
+                </a:solidFill>
+              </a:rPr>
+              <a:t>annotation &amp; </a:t>
+            </a:r>
+            <a:r>
+              <a:rPr lang="en-US" sz="2800" dirty="0" smtClean="0">
+                <a:solidFill>
+                  <a:schemeClr val="tx1"/>
+                </a:solidFill>
+              </a:rPr>
+              <a:t>java code </a:t>
+            </a:r>
+          </a:p>
+          <a:p>
+            <a:r>
+              <a:rPr lang="en-US" sz="2800" dirty="0" smtClean="0">
+                <a:solidFill>
+                  <a:schemeClr val="tx1"/>
+                </a:solidFill>
+              </a:rPr>
+              <a:t>Bean Scope: singleton, prototype, request, session, application, </a:t>
+            </a:r>
+            <a:r>
+              <a:rPr lang="en-US" sz="2800" dirty="0" err="1" smtClean="0">
+                <a:solidFill>
+                  <a:schemeClr val="tx1"/>
+                </a:solidFill>
+              </a:rPr>
+              <a:t>websocket</a:t>
+            </a:r>
+            <a:endParaRPr lang="en-US" sz="2800" dirty="0" smtClean="0">
+              <a:solidFill>
+                <a:schemeClr val="tx1"/>
+              </a:solidFill>
+            </a:endParaRPr>
+          </a:p>
+          <a:p>
+            <a:r>
+              <a:rPr lang="en-US" sz="2800" dirty="0" smtClean="0">
+                <a:solidFill>
+                  <a:schemeClr val="tx1"/>
+                </a:solidFill>
+              </a:rPr>
+              <a:t>Bean Life Cycle: </a:t>
             </a:r>
           </a:p>
           <a:p>
             <a:pPr lvl="1"/>
             <a:r>
-              <a:rPr lang="en-US" dirty="0"/>
-              <a:t>&lt;bean&gt;</a:t>
+              <a:rPr lang="en-US" sz="2800" dirty="0" err="1" smtClean="0">
+                <a:solidFill>
+                  <a:schemeClr val="tx1"/>
+                </a:solidFill>
+              </a:rPr>
+              <a:t>Init</a:t>
+            </a:r>
+            <a:r>
+              <a:rPr lang="en-US" sz="2800" dirty="0" smtClean="0">
+                <a:solidFill>
+                  <a:schemeClr val="tx1"/>
+                </a:solidFill>
+              </a:rPr>
+              <a:t>-method</a:t>
+            </a:r>
+          </a:p>
+          <a:p>
+            <a:pPr lvl="1"/>
+            <a:r>
+              <a:rPr lang="en-US" sz="2800" dirty="0" smtClean="0">
+                <a:solidFill>
+                  <a:schemeClr val="tx1"/>
+                </a:solidFill>
+              </a:rPr>
+              <a:t>destroy-method:</a:t>
             </a:r>
           </a:p>
           <a:p>
             <a:pPr lvl="2"/>
             <a:r>
-              <a:rPr lang="en-US" dirty="0"/>
-              <a:t>name, class, </a:t>
-            </a:r>
-            <a:r>
-              <a:rPr lang="en-US" dirty="0" err="1" smtClean="0"/>
-              <a:t>contructor-arg</a:t>
-            </a:r>
-            <a:r>
-              <a:rPr lang="en-US" dirty="0" smtClean="0"/>
-              <a:t>, </a:t>
-            </a:r>
-            <a:r>
-              <a:rPr lang="en-US" dirty="0"/>
-              <a:t>properties, </a:t>
-            </a:r>
-            <a:r>
-              <a:rPr lang="en-US" dirty="0" err="1"/>
-              <a:t>init</a:t>
-            </a:r>
-            <a:r>
-              <a:rPr lang="en-US" dirty="0"/>
-              <a:t>-method, destroy-method, </a:t>
-            </a:r>
-            <a:r>
-              <a:rPr lang="en-US" dirty="0" smtClean="0"/>
-              <a:t>scope</a:t>
+              <a:rPr lang="en-US" sz="2400" dirty="0" err="1" smtClean="0">
+                <a:solidFill>
+                  <a:schemeClr val="tx1"/>
+                </a:solidFill>
+              </a:rPr>
+              <a:t>AbstractApplicationContext</a:t>
+            </a:r>
+            <a:r>
+              <a:rPr lang="en-US" sz="2400" dirty="0" smtClean="0">
+                <a:solidFill>
+                  <a:schemeClr val="tx1"/>
+                </a:solidFill>
+              </a:rPr>
+              <a:t> context </a:t>
+            </a:r>
+            <a:r>
+              <a:rPr lang="en-US" sz="2400" smtClean="0">
+                <a:solidFill>
+                  <a:schemeClr val="tx1"/>
+                </a:solidFill>
+              </a:rPr>
+              <a:t>-&gt; </a:t>
+            </a:r>
+            <a:r>
+              <a:rPr lang="en-US" sz="2400" smtClean="0">
+                <a:solidFill>
+                  <a:schemeClr val="tx1"/>
+                </a:solidFill>
+              </a:rPr>
+              <a:t>context</a:t>
             </a:r>
           </a:p>
           <a:p>
             <a:pPr lvl="2"/>
             <a:r>
-              <a:rPr lang="en-US" dirty="0" err="1" smtClean="0"/>
-              <a:t>Autowire</a:t>
-            </a:r>
-            <a:r>
-              <a:rPr lang="en-US" dirty="0" smtClean="0"/>
-              <a:t>: </a:t>
-            </a:r>
-            <a:r>
-              <a:rPr lang="en-US" dirty="0"/>
-              <a:t>No, </a:t>
-            </a:r>
-            <a:r>
-              <a:rPr lang="en-US" dirty="0" err="1"/>
-              <a:t>byType</a:t>
-            </a:r>
-            <a:r>
-              <a:rPr lang="en-US" dirty="0"/>
-              <a:t>, </a:t>
-            </a:r>
-            <a:r>
-              <a:rPr lang="en-US" dirty="0" err="1"/>
-              <a:t>byName</a:t>
-            </a:r>
-            <a:r>
-              <a:rPr lang="en-US" dirty="0"/>
-              <a:t>, </a:t>
-            </a:r>
-            <a:r>
-              <a:rPr lang="en-US" dirty="0" err="1"/>
-              <a:t>contructor</a:t>
-            </a:r>
-            <a:r>
-              <a:rPr lang="en-US" dirty="0"/>
-              <a:t>, </a:t>
-            </a:r>
-            <a:r>
-              <a:rPr lang="en-US" dirty="0" err="1" smtClean="0"/>
-              <a:t>autodetect</a:t>
-            </a:r>
-            <a:endParaRPr lang="en-US" dirty="0"/>
-          </a:p>
-          <a:p>
-            <a:pPr lvl="1"/>
-            <a:r>
-              <a:rPr lang="en-US" dirty="0"/>
-              <a:t>&lt;property&gt;</a:t>
-            </a:r>
-          </a:p>
-          <a:p>
-            <a:pPr lvl="1"/>
-            <a:r>
-              <a:rPr lang="en-US" dirty="0"/>
-              <a:t>&lt;constructor-</a:t>
-            </a:r>
-            <a:r>
-              <a:rPr lang="en-US" dirty="0" err="1"/>
-              <a:t>arg</a:t>
-            </a:r>
-            <a:r>
-              <a:rPr lang="en-US" dirty="0"/>
-              <a:t>&gt; </a:t>
-            </a:r>
-            <a:endParaRPr lang="en-US" dirty="0" smtClean="0"/>
-          </a:p>
-          <a:p>
-            <a:r>
-              <a:rPr lang="en-US" dirty="0" smtClean="0"/>
-              <a:t>Annotation </a:t>
-            </a:r>
-            <a:r>
-              <a:rPr lang="en-US" dirty="0"/>
-              <a:t>Base </a:t>
-            </a:r>
-            <a:r>
-              <a:rPr lang="en-US" dirty="0" smtClean="0"/>
-              <a:t>Configure: </a:t>
-            </a:r>
-          </a:p>
-          <a:p>
-            <a:pPr lvl="1"/>
-            <a:r>
-              <a:rPr lang="en-US" dirty="0" err="1" smtClean="0"/>
-              <a:t>thêm</a:t>
-            </a:r>
-            <a:r>
-              <a:rPr lang="en-US" dirty="0" smtClean="0"/>
-              <a:t> </a:t>
-            </a:r>
-            <a:r>
-              <a:rPr lang="en-US" dirty="0" err="1" smtClean="0"/>
-              <a:t>cấu</a:t>
-            </a:r>
-            <a:r>
-              <a:rPr lang="en-US" dirty="0" smtClean="0"/>
-              <a:t> </a:t>
-            </a:r>
-            <a:r>
-              <a:rPr lang="en-US" dirty="0" err="1" smtClean="0"/>
-              <a:t>hình</a:t>
-            </a:r>
-            <a:r>
-              <a:rPr lang="en-US" dirty="0" smtClean="0"/>
-              <a:t> </a:t>
-            </a:r>
-            <a:r>
-              <a:rPr lang="en-US" dirty="0" err="1" smtClean="0"/>
-              <a:t>trong</a:t>
-            </a:r>
-            <a:r>
-              <a:rPr lang="en-US" dirty="0" smtClean="0"/>
-              <a:t> xml configure: </a:t>
-            </a:r>
-            <a:r>
-              <a:rPr lang="en-US" dirty="0"/>
-              <a:t>&lt;</a:t>
-            </a:r>
-            <a:r>
-              <a:rPr lang="en-US" dirty="0" err="1"/>
-              <a:t>context:annotation-config</a:t>
-            </a:r>
-            <a:r>
-              <a:rPr lang="en-US" dirty="0" smtClean="0"/>
-              <a:t>/&gt;, </a:t>
-            </a:r>
-            <a:r>
-              <a:rPr lang="en-US" dirty="0" err="1" smtClean="0"/>
-              <a:t>trong</a:t>
-            </a:r>
-            <a:r>
-              <a:rPr lang="en-US" dirty="0" smtClean="0"/>
-              <a:t> &lt;beans …&gt;</a:t>
-            </a:r>
-          </a:p>
-          <a:p>
-            <a:pPr lvl="1"/>
-            <a:r>
-              <a:rPr lang="en-US" dirty="0" smtClean="0"/>
-              <a:t>@Required: </a:t>
-            </a:r>
-            <a:r>
-              <a:rPr lang="en-US" dirty="0" err="1" smtClean="0"/>
-              <a:t>thực</a:t>
-            </a:r>
-            <a:r>
-              <a:rPr lang="en-US" dirty="0" smtClean="0"/>
-              <a:t> </a:t>
-            </a:r>
-            <a:r>
-              <a:rPr lang="en-US" dirty="0" err="1" smtClean="0"/>
-              <a:t>hiên</a:t>
-            </a:r>
-            <a:r>
-              <a:rPr lang="en-US" dirty="0" smtClean="0"/>
-              <a:t> </a:t>
-            </a:r>
-            <a:r>
-              <a:rPr lang="en-US" dirty="0" err="1" smtClean="0"/>
-              <a:t>trên</a:t>
-            </a:r>
-            <a:r>
-              <a:rPr lang="en-US" dirty="0" smtClean="0"/>
-              <a:t> </a:t>
-            </a:r>
-            <a:r>
-              <a:rPr lang="en-US" dirty="0" err="1" smtClean="0"/>
-              <a:t>các</a:t>
-            </a:r>
-            <a:r>
-              <a:rPr lang="en-US" dirty="0" smtClean="0"/>
-              <a:t> property setter method</a:t>
-            </a:r>
-          </a:p>
-          <a:p>
-            <a:pPr lvl="1"/>
-            <a:r>
-              <a:rPr lang="en-US" dirty="0" smtClean="0"/>
-              <a:t>@</a:t>
-            </a:r>
-            <a:r>
-              <a:rPr lang="en-US" dirty="0" err="1" smtClean="0"/>
-              <a:t>Autowired</a:t>
-            </a:r>
-            <a:r>
-              <a:rPr lang="en-US" dirty="0" smtClean="0"/>
-              <a:t>: </a:t>
-            </a:r>
-            <a:r>
-              <a:rPr lang="en-US" dirty="0" err="1" smtClean="0"/>
-              <a:t>trên</a:t>
-            </a:r>
-            <a:r>
-              <a:rPr lang="en-US" dirty="0" smtClean="0"/>
-              <a:t> </a:t>
-            </a:r>
-            <a:r>
-              <a:rPr lang="en-US" dirty="0" err="1" smtClean="0"/>
-              <a:t>contructor</a:t>
-            </a:r>
-            <a:r>
-              <a:rPr lang="en-US" dirty="0" smtClean="0"/>
-              <a:t>, properties, property setter method, non-setter method</a:t>
-            </a:r>
-          </a:p>
-          <a:p>
-            <a:pPr lvl="2"/>
-            <a:r>
-              <a:rPr lang="en-US" dirty="0"/>
-              <a:t>@</a:t>
-            </a:r>
-            <a:r>
-              <a:rPr lang="en-US" dirty="0" err="1"/>
-              <a:t>Autowired</a:t>
-            </a:r>
-            <a:r>
-              <a:rPr lang="en-US" dirty="0"/>
-              <a:t>(required=false</a:t>
-            </a:r>
-            <a:r>
-              <a:rPr lang="en-US" dirty="0" smtClean="0"/>
-              <a:t>): </a:t>
-            </a:r>
-            <a:r>
-              <a:rPr lang="en-US" dirty="0" err="1" smtClean="0"/>
-              <a:t>mặc</a:t>
-            </a:r>
-            <a:r>
-              <a:rPr lang="en-US" dirty="0" smtClean="0"/>
-              <a:t> </a:t>
-            </a:r>
-            <a:r>
-              <a:rPr lang="en-US" dirty="0" err="1" smtClean="0"/>
-              <a:t>định</a:t>
-            </a:r>
-            <a:r>
-              <a:rPr lang="en-US" dirty="0" smtClean="0"/>
-              <a:t> </a:t>
-            </a:r>
-            <a:r>
-              <a:rPr lang="en-US" dirty="0" err="1" smtClean="0"/>
-              <a:t>yêu</a:t>
-            </a:r>
-            <a:r>
-              <a:rPr lang="en-US" dirty="0" smtClean="0"/>
-              <a:t> </a:t>
-            </a:r>
-            <a:r>
-              <a:rPr lang="en-US" dirty="0" err="1" smtClean="0"/>
-              <a:t>cầu</a:t>
-            </a:r>
-            <a:r>
-              <a:rPr lang="en-US" dirty="0" smtClean="0"/>
-              <a:t> required</a:t>
-            </a:r>
-          </a:p>
-          <a:p>
-            <a:pPr lvl="2"/>
-            <a:r>
-              <a:rPr lang="en-US" dirty="0" err="1" smtClean="0"/>
-              <a:t>Chỉ</a:t>
-            </a:r>
-            <a:r>
-              <a:rPr lang="en-US" dirty="0" smtClean="0"/>
-              <a:t> </a:t>
-            </a:r>
-            <a:r>
-              <a:rPr lang="en-US" dirty="0" err="1" smtClean="0"/>
-              <a:t>cố</a:t>
-            </a:r>
-            <a:r>
-              <a:rPr lang="en-US" dirty="0" smtClean="0"/>
-              <a:t> </a:t>
-            </a:r>
-            <a:r>
-              <a:rPr lang="en-US" dirty="0" err="1" smtClean="0"/>
-              <a:t>gắng</a:t>
-            </a:r>
-            <a:r>
-              <a:rPr lang="en-US" dirty="0" smtClean="0"/>
-              <a:t> </a:t>
-            </a:r>
-            <a:r>
-              <a:rPr lang="en-US" dirty="0" err="1" smtClean="0"/>
-              <a:t>thực</a:t>
-            </a:r>
-            <a:r>
-              <a:rPr lang="en-US" dirty="0" smtClean="0"/>
-              <a:t> </a:t>
-            </a:r>
-            <a:r>
-              <a:rPr lang="en-US" dirty="0" err="1" smtClean="0"/>
-              <a:t>hiện</a:t>
-            </a:r>
-            <a:r>
-              <a:rPr lang="en-US" dirty="0" smtClean="0"/>
-              <a:t> </a:t>
-            </a:r>
-            <a:r>
-              <a:rPr lang="en-US" dirty="0" err="1" smtClean="0"/>
-              <a:t>autowiring</a:t>
-            </a:r>
-            <a:r>
-              <a:rPr lang="en-US" dirty="0" smtClean="0"/>
-              <a:t> </a:t>
-            </a:r>
-            <a:r>
-              <a:rPr lang="en-US" dirty="0" err="1" smtClean="0"/>
-              <a:t>byType</a:t>
-            </a:r>
-            <a:endParaRPr lang="en-US" dirty="0" smtClean="0"/>
-          </a:p>
-          <a:p>
-            <a:pPr lvl="1"/>
-            <a:r>
-              <a:rPr lang="en-US" dirty="0" smtClean="0"/>
-              <a:t>@Qualifier: </a:t>
-            </a:r>
-            <a:endParaRPr lang="en-US" dirty="0"/>
-          </a:p>
-          <a:p>
-            <a:r>
-              <a:rPr lang="en-US" dirty="0"/>
-              <a:t>Java Base Configure</a:t>
-            </a:r>
-          </a:p>
-          <a:p>
-            <a:endParaRPr lang="en-US" dirty="0"/>
+              <a:rPr lang="en-US" sz="2400" smtClean="0">
+                <a:solidFill>
+                  <a:schemeClr val="tx1"/>
+                </a:solidFill>
+              </a:rPr>
+              <a:t>.registerShutdownHook</a:t>
+            </a:r>
+            <a:r>
+              <a:rPr lang="en-US" sz="2400" dirty="0" smtClean="0">
+                <a:solidFill>
+                  <a:schemeClr val="tx1"/>
+                </a:solidFill>
+              </a:rPr>
+              <a:t>()</a:t>
+            </a:r>
+            <a:endParaRPr lang="en-US" sz="2400" dirty="0">
+              <a:solidFill>
+                <a:schemeClr val="tx1"/>
+              </a:solidFill>
+            </a:endParaRPr>
           </a:p>
         </p:txBody>
       </p:sp>
     </p:spTree>
     <p:extLst>
       <p:ext uri="{BB962C8B-B14F-4D97-AF65-F5344CB8AC3E}">
-        <p14:creationId xmlns:p14="http://schemas.microsoft.com/office/powerpoint/2010/main" val="2466659363"/>
+        <p14:creationId xmlns:p14="http://schemas.microsoft.com/office/powerpoint/2010/main" val="2111838338"/>
       </p:ext>
     </p:extLst>
   </p:cSld>
   <p:clrMapOvr>
     <a:masterClrMapping/>
   </p:clrMapOvr>
+  <p:timing>
+    <p:tnLst>
+      <p:par>
+        <p:cTn id="1" dur="indefinite" restart="never" nodeType="tmRoot"/>
+      </p:par>
+    </p:tnLst>
+  </p:timing>
 </p:sld>
 </file>
 
@@ -4743,16 +5272,8 @@
           <a:lstStyle/>
           <a:p>
             <a:r>
-              <a:rPr lang="en-US" dirty="0" smtClean="0"/>
-              <a:t>Dependency </a:t>
-            </a:r>
-            <a:r>
-              <a:rPr lang="en-US" dirty="0"/>
-              <a:t>I</a:t>
-            </a:r>
-            <a:r>
-              <a:rPr lang="en-US" dirty="0" smtClean="0"/>
-              <a:t>njection</a:t>
+              <a:rPr lang="en-US" smtClean="0"/>
+              <a:t>Beans</a:t>
             </a:r>
             <a:endParaRPr lang="en-US" dirty="0"/>
           </a:p>
@@ -4768,48 +5289,351 @@
             <p:ph idx="1"/>
           </p:nvPr>
         </p:nvSpPr>
-        <p:spPr/>
-        <p:txBody>
-          <a:bodyPr/>
-          <a:lstStyle/>
-          <a:p>
-            <a:r>
-              <a:rPr lang="en-US" dirty="0" smtClean="0"/>
-              <a:t>Constructor-based: &lt;constructor-</a:t>
-            </a:r>
-            <a:r>
-              <a:rPr lang="en-US" dirty="0" err="1" smtClean="0"/>
+        <p:spPr>
+          <a:xfrm>
+            <a:off x="910989" y="1525136"/>
+            <a:ext cx="9010934" cy="5080379"/>
+          </a:xfrm>
+        </p:spPr>
+        <p:txBody>
+          <a:bodyPr>
+            <a:noAutofit/>
+          </a:bodyPr>
+          <a:lstStyle/>
+          <a:p>
+            <a:pPr marL="45720" indent="0">
+              <a:buNone/>
+            </a:pPr>
+            <a:r>
+              <a:rPr lang="en-US" sz="2800">
+                <a:solidFill>
+                  <a:schemeClr val="tx1"/>
+                </a:solidFill>
+              </a:rPr>
+              <a:t>Beans Difinition</a:t>
+            </a:r>
+          </a:p>
+          <a:p>
+            <a:r>
+              <a:rPr lang="en-US" sz="2400" smtClean="0">
+                <a:solidFill>
+                  <a:schemeClr val="tx1"/>
+                </a:solidFill>
+              </a:rPr>
+              <a:t>XML </a:t>
+            </a:r>
+          </a:p>
+          <a:p>
+            <a:pPr lvl="1"/>
+            <a:r>
+              <a:rPr lang="en-US" smtClean="0">
+                <a:solidFill>
+                  <a:schemeClr val="tx1"/>
+                </a:solidFill>
+              </a:rPr>
+              <a:t>&lt;bean&gt;</a:t>
+            </a:r>
+          </a:p>
+          <a:p>
+            <a:pPr lvl="2"/>
+            <a:r>
+              <a:rPr lang="en-US" sz="2000" smtClean="0">
+                <a:solidFill>
+                  <a:schemeClr val="tx1"/>
+                </a:solidFill>
+              </a:rPr>
+              <a:t>name</a:t>
+            </a:r>
+            <a:r>
+              <a:rPr lang="en-US" sz="2000">
+                <a:solidFill>
+                  <a:schemeClr val="tx1"/>
+                </a:solidFill>
+              </a:rPr>
+              <a:t>, </a:t>
+            </a:r>
+            <a:r>
+              <a:rPr lang="en-US" sz="2000" smtClean="0">
+                <a:solidFill>
+                  <a:schemeClr val="tx1"/>
+                </a:solidFill>
+              </a:rPr>
+              <a:t>class, </a:t>
+            </a:r>
+            <a:r>
+              <a:rPr lang="en-US" sz="2000" dirty="0" err="1">
+                <a:solidFill>
+                  <a:schemeClr val="tx1"/>
+                </a:solidFill>
+              </a:rPr>
+              <a:t>init</a:t>
+            </a:r>
+            <a:r>
+              <a:rPr lang="en-US" sz="2000" dirty="0">
+                <a:solidFill>
+                  <a:schemeClr val="tx1"/>
+                </a:solidFill>
+              </a:rPr>
+              <a:t>-method, destroy-method</a:t>
+            </a:r>
+            <a:r>
+              <a:rPr lang="en-US" sz="2000">
+                <a:solidFill>
+                  <a:schemeClr val="tx1"/>
+                </a:solidFill>
+              </a:rPr>
+              <a:t>, </a:t>
+            </a:r>
+            <a:r>
+              <a:rPr lang="en-US" sz="2000" smtClean="0">
+                <a:solidFill>
+                  <a:schemeClr val="tx1"/>
+                </a:solidFill>
+              </a:rPr>
+              <a:t>scope, factory-method</a:t>
+            </a:r>
+            <a:endParaRPr lang="en-US" sz="2000" dirty="0" smtClean="0">
+              <a:solidFill>
+                <a:schemeClr val="tx1"/>
+              </a:solidFill>
+            </a:endParaRPr>
+          </a:p>
+          <a:p>
+            <a:pPr lvl="2"/>
+            <a:r>
+              <a:rPr lang="en-US" sz="2000" dirty="0" err="1" smtClean="0">
+                <a:solidFill>
+                  <a:schemeClr val="tx1"/>
+                </a:solidFill>
+              </a:rPr>
+              <a:t>Autowire</a:t>
+            </a:r>
+            <a:r>
+              <a:rPr lang="en-US" sz="2000" dirty="0" smtClean="0">
+                <a:solidFill>
+                  <a:schemeClr val="tx1"/>
+                </a:solidFill>
+              </a:rPr>
+              <a:t>: </a:t>
+            </a:r>
+            <a:r>
+              <a:rPr lang="en-US" sz="2000" dirty="0">
+                <a:solidFill>
+                  <a:schemeClr val="tx1"/>
+                </a:solidFill>
+              </a:rPr>
+              <a:t>No, </a:t>
+            </a:r>
+            <a:r>
+              <a:rPr lang="en-US" sz="2000" dirty="0" err="1">
+                <a:solidFill>
+                  <a:schemeClr val="tx1"/>
+                </a:solidFill>
+              </a:rPr>
+              <a:t>byType</a:t>
+            </a:r>
+            <a:r>
+              <a:rPr lang="en-US" sz="2000" dirty="0">
+                <a:solidFill>
+                  <a:schemeClr val="tx1"/>
+                </a:solidFill>
+              </a:rPr>
+              <a:t>, </a:t>
+            </a:r>
+            <a:r>
+              <a:rPr lang="en-US" sz="2000" dirty="0" err="1">
+                <a:solidFill>
+                  <a:schemeClr val="tx1"/>
+                </a:solidFill>
+              </a:rPr>
+              <a:t>byName</a:t>
+            </a:r>
+            <a:r>
+              <a:rPr lang="en-US" sz="2000" dirty="0">
+                <a:solidFill>
+                  <a:schemeClr val="tx1"/>
+                </a:solidFill>
+              </a:rPr>
+              <a:t>, </a:t>
+            </a:r>
+            <a:r>
+              <a:rPr lang="en-US" sz="2000" dirty="0" err="1">
+                <a:solidFill>
+                  <a:schemeClr val="tx1"/>
+                </a:solidFill>
+              </a:rPr>
+              <a:t>contructor</a:t>
+            </a:r>
+            <a:r>
+              <a:rPr lang="en-US" sz="2000" dirty="0">
+                <a:solidFill>
+                  <a:schemeClr val="tx1"/>
+                </a:solidFill>
+              </a:rPr>
+              <a:t>, </a:t>
+            </a:r>
+            <a:r>
+              <a:rPr lang="en-US" sz="2000" dirty="0" err="1" smtClean="0">
+                <a:solidFill>
+                  <a:schemeClr val="tx1"/>
+                </a:solidFill>
+              </a:rPr>
+              <a:t>autodetect</a:t>
+            </a:r>
+            <a:endParaRPr lang="en-US" sz="2000" dirty="0">
+              <a:solidFill>
+                <a:schemeClr val="tx1"/>
+              </a:solidFill>
+            </a:endParaRPr>
+          </a:p>
+          <a:p>
+            <a:pPr lvl="1"/>
+            <a:r>
+              <a:rPr lang="en-US" sz="2400" dirty="0">
+                <a:solidFill>
+                  <a:schemeClr val="tx1"/>
+                </a:solidFill>
+              </a:rPr>
+              <a:t>&lt;property&gt;</a:t>
+            </a:r>
+          </a:p>
+          <a:p>
+            <a:pPr lvl="1"/>
+            <a:r>
+              <a:rPr lang="en-US" sz="2400" dirty="0">
+                <a:solidFill>
+                  <a:schemeClr val="tx1"/>
+                </a:solidFill>
+              </a:rPr>
+              <a:t>&lt;constructor-</a:t>
+            </a:r>
+            <a:r>
+              <a:rPr lang="en-US" sz="2400" dirty="0" err="1">
+                <a:solidFill>
+                  <a:schemeClr val="tx1"/>
+                </a:solidFill>
+              </a:rPr>
               <a:t>arg</a:t>
             </a:r>
             <a:r>
-              <a:rPr lang="en-US" dirty="0" smtClean="0"/>
-              <a:t> name=“…” value||ref=“…” /&gt;</a:t>
-            </a:r>
-          </a:p>
-          <a:p>
-            <a:r>
-              <a:rPr lang="en-US" dirty="0" smtClean="0"/>
-              <a:t>Setter-based: &lt;property name=“…” value||ref=“…” /&gt;</a:t>
-            </a:r>
-          </a:p>
-          <a:p>
-            <a:pPr marL="45720" indent="0">
-              <a:buNone/>
-            </a:pPr>
-            <a:endParaRPr lang="en-US" dirty="0"/>
+              <a:rPr lang="en-US" sz="2400" dirty="0">
+                <a:solidFill>
+                  <a:schemeClr val="tx1"/>
+                </a:solidFill>
+              </a:rPr>
+              <a:t>&gt; </a:t>
+            </a:r>
+            <a:endParaRPr lang="en-US" sz="2400" dirty="0" smtClean="0">
+              <a:solidFill>
+                <a:schemeClr val="tx1"/>
+              </a:solidFill>
+            </a:endParaRPr>
+          </a:p>
+          <a:p>
+            <a:r>
+              <a:rPr lang="en-US" sz="2400" dirty="0" smtClean="0">
+                <a:solidFill>
+                  <a:schemeClr val="tx1"/>
+                </a:solidFill>
+              </a:rPr>
+              <a:t>Annotation </a:t>
+            </a:r>
+            <a:r>
+              <a:rPr lang="en-US" sz="2400" dirty="0">
+                <a:solidFill>
+                  <a:schemeClr val="tx1"/>
+                </a:solidFill>
+              </a:rPr>
+              <a:t>Base </a:t>
+            </a:r>
+            <a:r>
+              <a:rPr lang="en-US" sz="2400" dirty="0" smtClean="0">
+                <a:solidFill>
+                  <a:schemeClr val="tx1"/>
+                </a:solidFill>
+              </a:rPr>
+              <a:t>Configure: </a:t>
+            </a:r>
+          </a:p>
+          <a:p>
+            <a:r>
+              <a:rPr lang="en-US" sz="2400" smtClean="0">
+                <a:solidFill>
+                  <a:schemeClr val="tx1"/>
+                </a:solidFill>
+              </a:rPr>
+              <a:t>Java </a:t>
+            </a:r>
+            <a:r>
+              <a:rPr lang="en-US" sz="2400">
+                <a:solidFill>
+                  <a:schemeClr val="tx1"/>
+                </a:solidFill>
+              </a:rPr>
+              <a:t>Base </a:t>
+            </a:r>
+            <a:r>
+              <a:rPr lang="en-US" sz="2400" smtClean="0">
+                <a:solidFill>
+                  <a:schemeClr val="tx1"/>
+                </a:solidFill>
+              </a:rPr>
+              <a:t>Configure</a:t>
+            </a:r>
+          </a:p>
+          <a:p>
+            <a:pPr lvl="1"/>
+            <a:r>
+              <a:rPr lang="en-US" smtClean="0">
+                <a:solidFill>
+                  <a:schemeClr val="tx1"/>
+                </a:solidFill>
+              </a:rPr>
+              <a:t>@Configuration: class mà cung cấp các định nghĩa bean cho container IoC</a:t>
+            </a:r>
+          </a:p>
+          <a:p>
+            <a:pPr lvl="1"/>
+            <a:r>
+              <a:rPr lang="en-US" smtClean="0">
+                <a:solidFill>
+                  <a:schemeClr val="tx1"/>
+                </a:solidFill>
+              </a:rPr>
+              <a:t>@Bean: phương thức mà trả về 1 object và object đó được đăng ký như 1 bean</a:t>
+            </a:r>
+            <a:endParaRPr lang="en-US" dirty="0">
+              <a:solidFill>
+                <a:schemeClr val="tx1"/>
+              </a:solidFill>
+            </a:endParaRPr>
+          </a:p>
+          <a:p>
+            <a:endParaRPr lang="en-US" sz="1600" dirty="0">
+              <a:solidFill>
+                <a:schemeClr val="tx1"/>
+              </a:solidFill>
+            </a:endParaRPr>
           </a:p>
         </p:txBody>
       </p:sp>
     </p:spTree>
     <p:extLst>
       <p:ext uri="{BB962C8B-B14F-4D97-AF65-F5344CB8AC3E}">
-        <p14:creationId xmlns:p14="http://schemas.microsoft.com/office/powerpoint/2010/main" val="1736113905"/>
+        <p14:creationId xmlns:p14="http://schemas.microsoft.com/office/powerpoint/2010/main" val="2466659363"/>
       </p:ext>
     </p:extLst>
   </p:cSld>
   <p:clrMapOvr>
     <a:masterClrMapping/>
   </p:clrMapOvr>
+  <p:timing>
+    <p:tnLst>
+      <p:par>
+        <p:cTn id="1" dur="indefinite" restart="never" nodeType="tmRoot"/>
+      </p:par>
+    </p:tnLst>
+  </p:timing>
 </p:sld>
 </file>
 
@@ -4846,8 +5670,8 @@
           <a:lstStyle/>
           <a:p>
             <a:r>
-              <a:rPr lang="en-US" dirty="0" smtClean="0"/>
-              <a:t>Spring MVC</a:t>
+              <a:rPr lang="en-US" smtClean="0"/>
+              <a:t>Beans</a:t>
             </a:r>
             <a:endParaRPr lang="en-US" dirty="0"/>
           </a:p>
@@ -4863,25 +5687,69 @@
             <p:ph idx="1"/>
           </p:nvPr>
         </p:nvSpPr>
-        <p:spPr/>
-        <p:txBody>
-          <a:bodyPr/>
-          <a:lstStyle/>
-          <a:p>
-            <a:endParaRPr lang="en-US"/>
+        <p:spPr>
+          <a:xfrm>
+            <a:off x="910989" y="1525136"/>
+            <a:ext cx="9010934" cy="5080379"/>
+          </a:xfrm>
+        </p:spPr>
+        <p:txBody>
+          <a:bodyPr>
+            <a:noAutofit/>
+          </a:bodyPr>
+          <a:lstStyle/>
+          <a:p>
+            <a:pPr marL="45720" indent="0">
+              <a:buNone/>
+            </a:pPr>
+            <a:r>
+              <a:rPr lang="en-US" sz="2800">
+                <a:solidFill>
+                  <a:schemeClr val="tx1"/>
+                </a:solidFill>
+              </a:rPr>
+              <a:t>Beans </a:t>
+            </a:r>
+            <a:r>
+              <a:rPr lang="en-US" sz="2800" smtClean="0">
+                <a:solidFill>
+                  <a:schemeClr val="tx1"/>
+                </a:solidFill>
+              </a:rPr>
+              <a:t>Scope</a:t>
+            </a:r>
+            <a:endParaRPr lang="en-US" sz="2800">
+              <a:solidFill>
+                <a:schemeClr val="tx1"/>
+              </a:solidFill>
+            </a:endParaRPr>
+          </a:p>
+          <a:p>
+            <a:endParaRPr lang="en-US" sz="1600" dirty="0">
+              <a:solidFill>
+                <a:schemeClr val="tx1"/>
+              </a:solidFill>
+            </a:endParaRPr>
           </a:p>
         </p:txBody>
       </p:sp>
     </p:spTree>
     <p:extLst>
       <p:ext uri="{BB962C8B-B14F-4D97-AF65-F5344CB8AC3E}">
-        <p14:creationId xmlns:p14="http://schemas.microsoft.com/office/powerpoint/2010/main" val="2116481890"/>
+        <p14:creationId xmlns:p14="http://schemas.microsoft.com/office/powerpoint/2010/main" val="2790798935"/>
       </p:ext>
     </p:extLst>
   </p:cSld>
   <p:clrMapOvr>
     <a:masterClrMapping/>
   </p:clrMapOvr>
+  <p:timing>
+    <p:tnLst>
+      <p:par>
+        <p:cTn id="1" dur="indefinite" restart="never" nodeType="tmRoot"/>
+      </p:par>
+    </p:tnLst>
+  </p:timing>
 </p:sld>
 </file>
 
@@ -5116,7 +5984,7 @@
   <a:extraClrSchemeLst/>
   <a:extLst>
     <a:ext uri="{05A4C25C-085E-4340-85A3-A5531E510DB2}">
-      <thm15:themeFamily xmlns:thm15="http://schemas.microsoft.com/office/thememl/2012/main" name="Basis" id="{5665723A-49BA-4B57-8411-A56F8F207965}" vid="{90E45F77-AEFC-46EF-A7C1-5B338C297B02}"/>
+      <thm15:themeFamily xmlns:thm15="http://schemas.microsoft.com/office/thememl/2012/main" xmlns="" name="Basis" id="{5665723A-49BA-4B57-8411-A56F8F207965}" vid="{90E45F77-AEFC-46EF-A7C1-5B338C297B02}"/>
     </a:ext>
   </a:extLst>
 </a:theme>

</xml_diff>